<commit_message>
Updated slides and examples for MVC and FunScript
</commit_message>
<xml_diff>
--- a/FunScript.pptx
+++ b/FunScript.pptx
@@ -7,8 +7,7 @@
   <p:sldIdLst>
     <p:sldId id="256" r:id="rId2"/>
     <p:sldId id="259" r:id="rId3"/>
-    <p:sldId id="267" r:id="rId4"/>
-    <p:sldId id="266" r:id="rId5"/>
+    <p:sldId id="266" r:id="rId4"/>
   </p:sldIdLst>
   <p:sldSz cx="12192000" cy="6858000"/>
   <p:notesSz cx="6858000" cy="9144000"/>
@@ -109,7 +108,7 @@
   </p:defaultTextStyle>
   <p:extLst>
     <p:ext uri="{EFAFB233-063F-42B5-8137-9DF3F51BA10A}">
-      <p15:sldGuideLst xmlns="" xmlns:p15="http://schemas.microsoft.com/office/powerpoint/2012/main">
+      <p15:sldGuideLst xmlns:p15="http://schemas.microsoft.com/office/powerpoint/2012/main" xmlns="">
         <p15:guide id="1" orient="horz" pos="2160">
           <p15:clr>
             <a:srgbClr val="A4A3A4"/>
@@ -309,7 +308,7 @@
           <a:p>
             <a:fld id="{4AAD347D-5ACD-4C99-B74B-A9C85AD731AF}" type="datetime1">
               <a:rPr lang="en-US" smtClean="0"/>
-              <a:t>7/6/2013</a:t>
+              <a:t>7/8/2013</a:t>
             </a:fld>
             <a:endParaRPr lang="en-US"/>
           </a:p>
@@ -579,7 +578,7 @@
           <a:p>
             <a:fld id="{4509A250-FF31-4206-8172-F9D3106AACB1}" type="datetime1">
               <a:rPr lang="en-US" smtClean="0"/>
-              <a:t>7/6/2013</a:t>
+              <a:t>7/8/2013</a:t>
             </a:fld>
             <a:endParaRPr lang="en-US" dirty="0"/>
           </a:p>
@@ -701,7 +700,7 @@
           <a:p>
             <a:fld id="{4509A250-FF31-4206-8172-F9D3106AACB1}" type="datetime1">
               <a:rPr lang="en-US" smtClean="0"/>
-              <a:t>7/6/2013</a:t>
+              <a:t>7/8/2013</a:t>
             </a:fld>
             <a:endParaRPr lang="en-US" dirty="0"/>
           </a:p>
@@ -890,7 +889,7 @@
           <a:p>
             <a:fld id="{4509A250-FF31-4206-8172-F9D3106AACB1}" type="datetime1">
               <a:rPr lang="en-US" smtClean="0"/>
-              <a:t>7/6/2013</a:t>
+              <a:t>7/8/2013</a:t>
             </a:fld>
             <a:endParaRPr lang="en-US" dirty="0"/>
           </a:p>
@@ -1360,7 +1359,7 @@
           <a:p>
             <a:fld id="{4509A250-FF31-4206-8172-F9D3106AACB1}" type="datetime1">
               <a:rPr lang="en-US" smtClean="0"/>
-              <a:t>7/6/2013</a:t>
+              <a:t>7/8/2013</a:t>
             </a:fld>
             <a:endParaRPr lang="en-US" dirty="0"/>
           </a:p>
@@ -1482,7 +1481,7 @@
           <a:p>
             <a:fld id="{4509A250-FF31-4206-8172-F9D3106AACB1}" type="datetime1">
               <a:rPr lang="en-US" smtClean="0"/>
-              <a:t>7/6/2013</a:t>
+              <a:t>7/8/2013</a:t>
             </a:fld>
             <a:endParaRPr lang="en-US" dirty="0"/>
           </a:p>
@@ -1768,7 +1767,7 @@
           <a:p>
             <a:fld id="{4509A250-FF31-4206-8172-F9D3106AACB1}" type="datetime1">
               <a:rPr lang="en-US" smtClean="0"/>
-              <a:t>7/6/2013</a:t>
+              <a:t>7/8/2013</a:t>
             </a:fld>
             <a:endParaRPr lang="en-US" dirty="0"/>
           </a:p>
@@ -2514,7 +2513,7 @@
           <a:p>
             <a:fld id="{4509A250-FF31-4206-8172-F9D3106AACB1}" type="datetime1">
               <a:rPr lang="en-US" smtClean="0"/>
-              <a:t>7/6/2013</a:t>
+              <a:t>7/8/2013</a:t>
             </a:fld>
             <a:endParaRPr lang="en-US" dirty="0"/>
           </a:p>
@@ -3356,7 +3355,7 @@
           <a:p>
             <a:fld id="{4509A250-FF31-4206-8172-F9D3106AACB1}" type="datetime1">
               <a:rPr lang="en-US" smtClean="0"/>
-              <a:t>7/6/2013</a:t>
+              <a:t>7/8/2013</a:t>
             </a:fld>
             <a:endParaRPr lang="en-US" dirty="0"/>
           </a:p>
@@ -3521,7 +3520,7 @@
           <a:p>
             <a:fld id="{4509A250-FF31-4206-8172-F9D3106AACB1}" type="datetime1">
               <a:rPr lang="en-US" smtClean="0"/>
-              <a:t>7/6/2013</a:t>
+              <a:t>7/8/2013</a:t>
             </a:fld>
             <a:endParaRPr lang="en-US" dirty="0"/>
           </a:p>
@@ -3696,7 +3695,7 @@
           <a:p>
             <a:fld id="{4509A250-FF31-4206-8172-F9D3106AACB1}" type="datetime1">
               <a:rPr lang="en-US" smtClean="0"/>
-              <a:t>7/6/2013</a:t>
+              <a:t>7/8/2013</a:t>
             </a:fld>
             <a:endParaRPr lang="en-US" dirty="0"/>
           </a:p>
@@ -3861,7 +3860,7 @@
           <a:p>
             <a:fld id="{4509A250-FF31-4206-8172-F9D3106AACB1}" type="datetime1">
               <a:rPr lang="en-US" smtClean="0"/>
-              <a:t>7/6/2013</a:t>
+              <a:t>7/8/2013</a:t>
             </a:fld>
             <a:endParaRPr lang="en-US" dirty="0"/>
           </a:p>
@@ -4100,7 +4099,7 @@
           <a:p>
             <a:fld id="{4509A250-FF31-4206-8172-F9D3106AACB1}" type="datetime1">
               <a:rPr lang="en-US" smtClean="0"/>
-              <a:t>7/6/2013</a:t>
+              <a:t>7/8/2013</a:t>
             </a:fld>
             <a:endParaRPr lang="en-US" dirty="0"/>
           </a:p>
@@ -4387,7 +4386,7 @@
           <a:p>
             <a:fld id="{4509A250-FF31-4206-8172-F9D3106AACB1}" type="datetime1">
               <a:rPr lang="en-US" smtClean="0"/>
-              <a:t>7/6/2013</a:t>
+              <a:t>7/8/2013</a:t>
             </a:fld>
             <a:endParaRPr lang="en-US" dirty="0"/>
           </a:p>
@@ -4820,7 +4819,7 @@
           <a:p>
             <a:fld id="{4509A250-FF31-4206-8172-F9D3106AACB1}" type="datetime1">
               <a:rPr lang="en-US" smtClean="0"/>
-              <a:t>7/6/2013</a:t>
+              <a:t>7/8/2013</a:t>
             </a:fld>
             <a:endParaRPr lang="en-US" dirty="0"/>
           </a:p>
@@ -4933,7 +4932,7 @@
           <a:p>
             <a:fld id="{4509A250-FF31-4206-8172-F9D3106AACB1}" type="datetime1">
               <a:rPr lang="en-US" smtClean="0"/>
-              <a:t>7/6/2013</a:t>
+              <a:t>7/8/2013</a:t>
             </a:fld>
             <a:endParaRPr lang="en-US" dirty="0"/>
           </a:p>
@@ -5023,7 +5022,7 @@
           <a:p>
             <a:fld id="{4509A250-FF31-4206-8172-F9D3106AACB1}" type="datetime1">
               <a:rPr lang="en-US" smtClean="0"/>
-              <a:t>7/6/2013</a:t>
+              <a:t>7/8/2013</a:t>
             </a:fld>
             <a:endParaRPr lang="en-US" dirty="0"/>
           </a:p>
@@ -5297,7 +5296,7 @@
           <a:p>
             <a:fld id="{4509A250-FF31-4206-8172-F9D3106AACB1}" type="datetime1">
               <a:rPr lang="en-US" smtClean="0"/>
-              <a:t>7/6/2013</a:t>
+              <a:t>7/8/2013</a:t>
             </a:fld>
             <a:endParaRPr lang="en-US" dirty="0"/>
           </a:p>
@@ -5567,7 +5566,7 @@
           <a:p>
             <a:fld id="{4509A250-FF31-4206-8172-F9D3106AACB1}" type="datetime1">
               <a:rPr lang="en-US" smtClean="0"/>
-              <a:t>7/6/2013</a:t>
+              <a:t>7/8/2013</a:t>
             </a:fld>
             <a:endParaRPr lang="en-US" dirty="0"/>
           </a:p>
@@ -6175,7 +6174,7 @@
           <a:p>
             <a:fld id="{4509A250-FF31-4206-8172-F9D3106AACB1}" type="datetime1">
               <a:rPr lang="en-US" smtClean="0"/>
-              <a:t>7/6/2013</a:t>
+              <a:t>7/8/2013</a:t>
             </a:fld>
             <a:endParaRPr lang="en-US" dirty="0"/>
           </a:p>
@@ -6952,12 +6951,8 @@
           </a:p>
           <a:p>
             <a:r>
-              <a:rPr lang="en-US" sz="2800" smtClean="0"/>
-              <a:t>Use </a:t>
-            </a:r>
-            <a:r>
               <a:rPr lang="en-US" sz="2800" dirty="0" smtClean="0"/>
-              <a:t>F# records, discriminated </a:t>
+              <a:t>Use F# records, discriminated </a:t>
             </a:r>
             <a:r>
               <a:rPr lang="en-US" sz="2800" dirty="0"/>
@@ -6989,13 +6984,19 @@
             </a:r>
             <a:r>
               <a:rPr lang="en-US" sz="2800" dirty="0" smtClean="0"/>
-              <a:t> workflows, etc.</a:t>
-            </a:r>
-          </a:p>
-          <a:p>
+              <a:t>       workflows</a:t>
+            </a:r>
             <a:r>
               <a:rPr lang="en-US" sz="2800" dirty="0" smtClean="0"/>
-              <a:t>Array, List, </a:t>
+              <a:t>, </a:t>
+            </a:r>
+            <a:r>
+              <a:rPr lang="en-US" sz="2800" dirty="0" smtClean="0"/>
+              <a:t>Array</a:t>
+            </a:r>
+            <a:r>
+              <a:rPr lang="en-US" sz="2800" dirty="0" smtClean="0"/>
+              <a:t>, List, </a:t>
             </a:r>
             <a:r>
               <a:rPr lang="en-US" sz="2800" dirty="0" err="1" smtClean="0"/>
@@ -7003,8 +7004,21 @@
             </a:r>
             <a:r>
               <a:rPr lang="en-US" sz="2800" dirty="0" smtClean="0"/>
-              <a:t>, Option, Map, Set</a:t>
-            </a:r>
+              <a:t>, Option, Map, </a:t>
+            </a:r>
+            <a:r>
+              <a:rPr lang="en-US" sz="2800" dirty="0" smtClean="0"/>
+              <a:t>Set, </a:t>
+            </a:r>
+            <a:r>
+              <a:rPr lang="en-US" sz="2800" dirty="0"/>
+              <a:t>e</a:t>
+            </a:r>
+            <a:r>
+              <a:rPr lang="en-US" sz="2800" dirty="0" smtClean="0"/>
+              <a:t>tc.</a:t>
+            </a:r>
+            <a:endParaRPr lang="en-US" sz="2800" dirty="0" smtClean="0"/>
           </a:p>
           <a:p>
             <a:r>
@@ -7122,141 +7136,6 @@
 </file>
 
 <file path=ppt/slides/slide3.xml><?xml version="1.0" encoding="utf-8"?>
-<p:sld xmlns:a="http://schemas.openxmlformats.org/drawingml/2006/main" xmlns:r="http://schemas.openxmlformats.org/officeDocument/2006/relationships" xmlns:p="http://schemas.openxmlformats.org/presentationml/2006/main">
-  <p:cSld>
-    <p:spTree>
-      <p:nvGrpSpPr>
-        <p:cNvPr id="1" name=""/>
-        <p:cNvGrpSpPr/>
-        <p:nvPr/>
-      </p:nvGrpSpPr>
-      <p:grpSpPr>
-        <a:xfrm>
-          <a:off x="0" y="0"/>
-          <a:ext cx="0" cy="0"/>
-          <a:chOff x="0" y="0"/>
-          <a:chExt cx="0" cy="0"/>
-        </a:xfrm>
-      </p:grpSpPr>
-      <p:sp>
-        <p:nvSpPr>
-          <p:cNvPr id="2" name="Title 1"/>
-          <p:cNvSpPr>
-            <a:spLocks noGrp="1"/>
-          </p:cNvSpPr>
-          <p:nvPr>
-            <p:ph type="title"/>
-          </p:nvPr>
-        </p:nvSpPr>
-        <p:spPr/>
-        <p:txBody>
-          <a:bodyPr/>
-          <a:lstStyle/>
-          <a:p>
-            <a:r>
-              <a:rPr lang="en-US" dirty="0" smtClean="0"/>
-              <a:t>Building a Solution with </a:t>
-            </a:r>
-            <a:r>
-              <a:rPr lang="en-US" dirty="0" err="1" smtClean="0"/>
-              <a:t>FunScript</a:t>
-            </a:r>
-            <a:endParaRPr lang="en-US" dirty="0"/>
-          </a:p>
-        </p:txBody>
-      </p:sp>
-      <p:sp>
-        <p:nvSpPr>
-          <p:cNvPr id="3" name="Content Placeholder 2"/>
-          <p:cNvSpPr>
-            <a:spLocks noGrp="1"/>
-          </p:cNvSpPr>
-          <p:nvPr>
-            <p:ph idx="1"/>
-          </p:nvPr>
-        </p:nvSpPr>
-        <p:spPr/>
-        <p:txBody>
-          <a:bodyPr>
-            <a:normAutofit/>
-          </a:bodyPr>
-          <a:lstStyle/>
-          <a:p>
-            <a:r>
-              <a:rPr lang="en-US" sz="2800" dirty="0" smtClean="0"/>
-              <a:t>A simple TODO app</a:t>
-            </a:r>
-          </a:p>
-          <a:p>
-            <a:r>
-              <a:rPr lang="en-US" sz="2800" dirty="0" smtClean="0"/>
-              <a:t>Reviewing the JavaScript</a:t>
-            </a:r>
-          </a:p>
-        </p:txBody>
-      </p:sp>
-      <p:pic>
-        <p:nvPicPr>
-          <p:cNvPr id="2050" name="Picture 2" descr="http://images.clipartof.com/small/1048741-Royalty-Free-RF-Clip-Art-Illustration-Of-A-Cartoon-Super-Geek.jpg"/>
-          <p:cNvPicPr>
-            <a:picLocks noChangeAspect="1" noChangeArrowheads="1"/>
-          </p:cNvPicPr>
-          <p:nvPr/>
-        </p:nvPicPr>
-        <p:blipFill>
-          <a:blip r:embed="rId2">
-            <a:extLst>
-              <a:ext uri="{28A0092B-C50C-407E-A947-70E740481C1C}">
-                <a14:useLocalDpi xmlns:a14="http://schemas.microsoft.com/office/drawing/2010/main" val="0"/>
-              </a:ext>
-            </a:extLst>
-          </a:blip>
-          <a:srcRect/>
-          <a:stretch>
-            <a:fillRect/>
-          </a:stretch>
-        </p:blipFill>
-        <p:spPr bwMode="auto">
-          <a:xfrm>
-            <a:off x="8807116" y="3564597"/>
-            <a:ext cx="3093787" cy="3059789"/>
-          </a:xfrm>
-          <a:prstGeom prst="rect">
-            <a:avLst/>
-          </a:prstGeom>
-          <a:noFill/>
-          <a:extLst>
-            <a:ext uri="{909E8E84-426E-40DD-AFC4-6F175D3DCCD1}">
-              <a14:hiddenFill xmlns:a14="http://schemas.microsoft.com/office/drawing/2010/main">
-                <a:solidFill>
-                  <a:srgbClr val="FFFFFF"/>
-                </a:solidFill>
-              </a14:hiddenFill>
-            </a:ext>
-          </a:extLst>
-        </p:spPr>
-      </p:pic>
-    </p:spTree>
-    <p:extLst>
-      <p:ext uri="{BB962C8B-B14F-4D97-AF65-F5344CB8AC3E}">
-        <p14:creationId xmlns:p14="http://schemas.microsoft.com/office/powerpoint/2010/main" val="912724147"/>
-      </p:ext>
-    </p:extLst>
-  </p:cSld>
-  <p:clrMapOvr>
-    <a:masterClrMapping/>
-  </p:clrMapOvr>
-  <p:timing>
-    <p:tnLst>
-      <p:par>
-        <p:cTn id="1" dur="indefinite" restart="never" nodeType="tmRoot"/>
-      </p:par>
-    </p:tnLst>
-  </p:timing>
-</p:sld>
-</file>
-
-<file path=ppt/slides/slide4.xml><?xml version="1.0" encoding="utf-8"?>
 <p:sld xmlns:a="http://schemas.openxmlformats.org/drawingml/2006/main" xmlns:r="http://schemas.openxmlformats.org/officeDocument/2006/relationships" xmlns:p="http://schemas.openxmlformats.org/presentationml/2006/main">
   <p:cSld>
     <p:spTree>
@@ -7650,7 +7529,7 @@
   <a:extraClrSchemeLst/>
   <a:extLst>
     <a:ext uri="{05A4C25C-085E-4340-85A3-A5531E510DB2}">
-      <thm15:themeFamily xmlns="" xmlns:thm15="http://schemas.microsoft.com/office/thememl/2012/main" name="Ion" id="{B8441ADB-2E43-4AF7-B97A-BD870242C6A8}" vid="{BACC050B-8757-4460-95D8-E37B46A6B421}"/>
+      <thm15:themeFamily xmlns:thm15="http://schemas.microsoft.com/office/thememl/2012/main" xmlns="" name="Ion" id="{B8441ADB-2E43-4AF7-B97A-BD870242C6A8}" vid="{BACC050B-8757-4460-95D8-E37B46A6B421}"/>
     </a:ext>
   </a:extLst>
 </a:theme>

</xml_diff>

<commit_message>
Added a Fog example
</commit_message>
<xml_diff>
--- a/FunScript.pptx
+++ b/FunScript.pptx
@@ -108,7 +108,7 @@
   </p:defaultTextStyle>
   <p:extLst>
     <p:ext uri="{EFAFB233-063F-42B5-8137-9DF3F51BA10A}">
-      <p15:sldGuideLst xmlns:p15="http://schemas.microsoft.com/office/powerpoint/2012/main" xmlns="">
+      <p15:sldGuideLst xmlns:p15="http://schemas.microsoft.com/office/powerpoint/2012/main">
         <p15:guide id="1" orient="horz" pos="2160">
           <p15:clr>
             <a:srgbClr val="A4A3A4"/>
@@ -308,7 +308,7 @@
           <a:p>
             <a:fld id="{4AAD347D-5ACD-4C99-B74B-A9C85AD731AF}" type="datetime1">
               <a:rPr lang="en-US" smtClean="0"/>
-              <a:t>7/8/2013</a:t>
+              <a:t>9/29/2013</a:t>
             </a:fld>
             <a:endParaRPr lang="en-US"/>
           </a:p>
@@ -578,7 +578,7 @@
           <a:p>
             <a:fld id="{4509A250-FF31-4206-8172-F9D3106AACB1}" type="datetime1">
               <a:rPr lang="en-US" smtClean="0"/>
-              <a:t>7/8/2013</a:t>
+              <a:t>9/29/2013</a:t>
             </a:fld>
             <a:endParaRPr lang="en-US" dirty="0"/>
           </a:p>
@@ -700,7 +700,7 @@
           <a:p>
             <a:fld id="{4509A250-FF31-4206-8172-F9D3106AACB1}" type="datetime1">
               <a:rPr lang="en-US" smtClean="0"/>
-              <a:t>7/8/2013</a:t>
+              <a:t>9/29/2013</a:t>
             </a:fld>
             <a:endParaRPr lang="en-US" dirty="0"/>
           </a:p>
@@ -889,7 +889,7 @@
           <a:p>
             <a:fld id="{4509A250-FF31-4206-8172-F9D3106AACB1}" type="datetime1">
               <a:rPr lang="en-US" smtClean="0"/>
-              <a:t>7/8/2013</a:t>
+              <a:t>9/29/2013</a:t>
             </a:fld>
             <a:endParaRPr lang="en-US" dirty="0"/>
           </a:p>
@@ -1359,7 +1359,7 @@
           <a:p>
             <a:fld id="{4509A250-FF31-4206-8172-F9D3106AACB1}" type="datetime1">
               <a:rPr lang="en-US" smtClean="0"/>
-              <a:t>7/8/2013</a:t>
+              <a:t>9/29/2013</a:t>
             </a:fld>
             <a:endParaRPr lang="en-US" dirty="0"/>
           </a:p>
@@ -1481,7 +1481,7 @@
           <a:p>
             <a:fld id="{4509A250-FF31-4206-8172-F9D3106AACB1}" type="datetime1">
               <a:rPr lang="en-US" smtClean="0"/>
-              <a:t>7/8/2013</a:t>
+              <a:t>9/29/2013</a:t>
             </a:fld>
             <a:endParaRPr lang="en-US" dirty="0"/>
           </a:p>
@@ -1767,7 +1767,7 @@
           <a:p>
             <a:fld id="{4509A250-FF31-4206-8172-F9D3106AACB1}" type="datetime1">
               <a:rPr lang="en-US" smtClean="0"/>
-              <a:t>7/8/2013</a:t>
+              <a:t>9/29/2013</a:t>
             </a:fld>
             <a:endParaRPr lang="en-US" dirty="0"/>
           </a:p>
@@ -2513,7 +2513,7 @@
           <a:p>
             <a:fld id="{4509A250-FF31-4206-8172-F9D3106AACB1}" type="datetime1">
               <a:rPr lang="en-US" smtClean="0"/>
-              <a:t>7/8/2013</a:t>
+              <a:t>9/29/2013</a:t>
             </a:fld>
             <a:endParaRPr lang="en-US" dirty="0"/>
           </a:p>
@@ -3355,7 +3355,7 @@
           <a:p>
             <a:fld id="{4509A250-FF31-4206-8172-F9D3106AACB1}" type="datetime1">
               <a:rPr lang="en-US" smtClean="0"/>
-              <a:t>7/8/2013</a:t>
+              <a:t>9/29/2013</a:t>
             </a:fld>
             <a:endParaRPr lang="en-US" dirty="0"/>
           </a:p>
@@ -3520,7 +3520,7 @@
           <a:p>
             <a:fld id="{4509A250-FF31-4206-8172-F9D3106AACB1}" type="datetime1">
               <a:rPr lang="en-US" smtClean="0"/>
-              <a:t>7/8/2013</a:t>
+              <a:t>9/29/2013</a:t>
             </a:fld>
             <a:endParaRPr lang="en-US" dirty="0"/>
           </a:p>
@@ -3695,7 +3695,7 @@
           <a:p>
             <a:fld id="{4509A250-FF31-4206-8172-F9D3106AACB1}" type="datetime1">
               <a:rPr lang="en-US" smtClean="0"/>
-              <a:t>7/8/2013</a:t>
+              <a:t>9/29/2013</a:t>
             </a:fld>
             <a:endParaRPr lang="en-US" dirty="0"/>
           </a:p>
@@ -3860,7 +3860,7 @@
           <a:p>
             <a:fld id="{4509A250-FF31-4206-8172-F9D3106AACB1}" type="datetime1">
               <a:rPr lang="en-US" smtClean="0"/>
-              <a:t>7/8/2013</a:t>
+              <a:t>9/29/2013</a:t>
             </a:fld>
             <a:endParaRPr lang="en-US" dirty="0"/>
           </a:p>
@@ -4099,7 +4099,7 @@
           <a:p>
             <a:fld id="{4509A250-FF31-4206-8172-F9D3106AACB1}" type="datetime1">
               <a:rPr lang="en-US" smtClean="0"/>
-              <a:t>7/8/2013</a:t>
+              <a:t>9/29/2013</a:t>
             </a:fld>
             <a:endParaRPr lang="en-US" dirty="0"/>
           </a:p>
@@ -4386,7 +4386,7 @@
           <a:p>
             <a:fld id="{4509A250-FF31-4206-8172-F9D3106AACB1}" type="datetime1">
               <a:rPr lang="en-US" smtClean="0"/>
-              <a:t>7/8/2013</a:t>
+              <a:t>9/29/2013</a:t>
             </a:fld>
             <a:endParaRPr lang="en-US" dirty="0"/>
           </a:p>
@@ -4819,7 +4819,7 @@
           <a:p>
             <a:fld id="{4509A250-FF31-4206-8172-F9D3106AACB1}" type="datetime1">
               <a:rPr lang="en-US" smtClean="0"/>
-              <a:t>7/8/2013</a:t>
+              <a:t>9/29/2013</a:t>
             </a:fld>
             <a:endParaRPr lang="en-US" dirty="0"/>
           </a:p>
@@ -4932,7 +4932,7 @@
           <a:p>
             <a:fld id="{4509A250-FF31-4206-8172-F9D3106AACB1}" type="datetime1">
               <a:rPr lang="en-US" smtClean="0"/>
-              <a:t>7/8/2013</a:t>
+              <a:t>9/29/2013</a:t>
             </a:fld>
             <a:endParaRPr lang="en-US" dirty="0"/>
           </a:p>
@@ -5022,7 +5022,7 @@
           <a:p>
             <a:fld id="{4509A250-FF31-4206-8172-F9D3106AACB1}" type="datetime1">
               <a:rPr lang="en-US" smtClean="0"/>
-              <a:t>7/8/2013</a:t>
+              <a:t>9/29/2013</a:t>
             </a:fld>
             <a:endParaRPr lang="en-US" dirty="0"/>
           </a:p>
@@ -5296,7 +5296,7 @@
           <a:p>
             <a:fld id="{4509A250-FF31-4206-8172-F9D3106AACB1}" type="datetime1">
               <a:rPr lang="en-US" smtClean="0"/>
-              <a:t>7/8/2013</a:t>
+              <a:t>9/29/2013</a:t>
             </a:fld>
             <a:endParaRPr lang="en-US" dirty="0"/>
           </a:p>
@@ -5566,7 +5566,7 @@
           <a:p>
             <a:fld id="{4509A250-FF31-4206-8172-F9D3106AACB1}" type="datetime1">
               <a:rPr lang="en-US" smtClean="0"/>
-              <a:t>7/8/2013</a:t>
+              <a:t>9/29/2013</a:t>
             </a:fld>
             <a:endParaRPr lang="en-US" dirty="0"/>
           </a:p>
@@ -6174,7 +6174,7 @@
           <a:p>
             <a:fld id="{4509A250-FF31-4206-8172-F9D3106AACB1}" type="datetime1">
               <a:rPr lang="en-US" smtClean="0"/>
-              <a:t>7/8/2013</a:t>
+              <a:t>9/29/2013</a:t>
             </a:fld>
             <a:endParaRPr lang="en-US" dirty="0"/>
           </a:p>
@@ -6737,7 +6737,15 @@
                 <a:ea typeface="Segoe UI" panose="020B0502040204020203" pitchFamily="34" charset="0"/>
                 <a:cs typeface="Segoe UI" panose="020B0502040204020203" pitchFamily="34" charset="0"/>
               </a:rPr>
-              <a:t>Ryan Riley and Daniel </a:t>
+              <a:t>Zach Bray </a:t>
+            </a:r>
+            <a:r>
+              <a:rPr lang="en-US" cap="none" dirty="0" smtClean="0">
+                <a:latin typeface="Segoe UI" panose="020B0502040204020203" pitchFamily="34" charset="0"/>
+                <a:ea typeface="Segoe UI" panose="020B0502040204020203" pitchFamily="34" charset="0"/>
+                <a:cs typeface="Segoe UI" panose="020B0502040204020203" pitchFamily="34" charset="0"/>
+              </a:rPr>
+              <a:t>and Daniel </a:t>
             </a:r>
             <a:r>
               <a:rPr lang="en-US" cap="none" dirty="0">
@@ -6775,7 +6783,7 @@
                 <a:ea typeface="Segoe UI" panose="020B0502040204020203" pitchFamily="34" charset="0"/>
                 <a:cs typeface="Segoe UI" panose="020B0502040204020203" pitchFamily="34" charset="0"/>
               </a:rPr>
-              <a:t>panesofglass</a:t>
+              <a:t>zbray</a:t>
             </a:r>
             <a:r>
               <a:rPr lang="en-US" cap="none" dirty="0" smtClean="0">
@@ -6783,7 +6791,15 @@
                 <a:ea typeface="Segoe UI" panose="020B0502040204020203" pitchFamily="34" charset="0"/>
                 <a:cs typeface="Segoe UI" panose="020B0502040204020203" pitchFamily="34" charset="0"/>
               </a:rPr>
-              <a:t> and @</a:t>
+              <a:t> </a:t>
+            </a:r>
+            <a:r>
+              <a:rPr lang="en-US" cap="none" dirty="0" smtClean="0">
+                <a:latin typeface="Segoe UI" panose="020B0502040204020203" pitchFamily="34" charset="0"/>
+                <a:ea typeface="Segoe UI" panose="020B0502040204020203" pitchFamily="34" charset="0"/>
+                <a:cs typeface="Segoe UI" panose="020B0502040204020203" pitchFamily="34" charset="0"/>
+              </a:rPr>
+              <a:t>and @</a:t>
             </a:r>
             <a:r>
               <a:rPr lang="en-US" cap="none" dirty="0" err="1" smtClean="0">
@@ -6810,7 +6826,7 @@
                 <a:ea typeface="Segoe UI" panose="020B0502040204020203" pitchFamily="34" charset="0"/>
                 <a:cs typeface="Segoe UI" panose="020B0502040204020203" pitchFamily="34" charset="0"/>
               </a:rPr>
-              <a:t>w</a:t>
+              <a:t>z</a:t>
             </a:r>
             <a:r>
               <a:rPr lang="en-US" cap="none" dirty="0" smtClean="0">
@@ -6818,22 +6834,40 @@
                 <a:ea typeface="Segoe UI" panose="020B0502040204020203" pitchFamily="34" charset="0"/>
                 <a:cs typeface="Segoe UI" panose="020B0502040204020203" pitchFamily="34" charset="0"/>
               </a:rPr>
-              <a:t>izardsofsmart.net</a:t>
-            </a:r>
+              <a:t>bray.com</a:t>
+            </a:r>
+            <a:endParaRPr lang="en-US" cap="none" dirty="0" smtClean="0">
+              <a:latin typeface="Segoe UI" panose="020B0502040204020203" pitchFamily="34" charset="0"/>
+              <a:ea typeface="Segoe UI" panose="020B0502040204020203" pitchFamily="34" charset="0"/>
+              <a:cs typeface="Segoe UI" panose="020B0502040204020203" pitchFamily="34" charset="0"/>
+            </a:endParaRPr>
           </a:p>
           <a:p>
             <a:pPr marL="342900" indent="-342900">
               <a:buFont typeface="Arial"/>
               <a:buChar char="•"/>
             </a:pPr>
+            <a:r>
+              <a:rPr lang="en-US" cap="none" dirty="0">
+                <a:latin typeface="Segoe UI" panose="020B0502040204020203" pitchFamily="34" charset="0"/>
+                <a:ea typeface="Segoe UI" panose="020B0502040204020203" pitchFamily="34" charset="0"/>
+                <a:cs typeface="Segoe UI" panose="020B0502040204020203" pitchFamily="34" charset="0"/>
+              </a:rPr>
+              <a:t>b</a:t>
+            </a:r>
             <a:r>
               <a:rPr lang="en-US" cap="none" dirty="0" smtClean="0">
                 <a:latin typeface="Segoe UI" panose="020B0502040204020203" pitchFamily="34" charset="0"/>
                 <a:ea typeface="Segoe UI" panose="020B0502040204020203" pitchFamily="34" charset="0"/>
                 <a:cs typeface="Segoe UI" panose="020B0502040204020203" pitchFamily="34" charset="0"/>
               </a:rPr>
-              <a:t>Blog.danielmohl.com</a:t>
-            </a:r>
+              <a:t>log.danielmohl.com</a:t>
+            </a:r>
+            <a:endParaRPr lang="en-US" cap="none" dirty="0" smtClean="0">
+              <a:latin typeface="Segoe UI" panose="020B0502040204020203" pitchFamily="34" charset="0"/>
+              <a:ea typeface="Segoe UI" panose="020B0502040204020203" pitchFamily="34" charset="0"/>
+              <a:cs typeface="Segoe UI" panose="020B0502040204020203" pitchFamily="34" charset="0"/>
+            </a:endParaRPr>
           </a:p>
           <a:p>
             <a:endParaRPr lang="en-US" dirty="0">
@@ -6984,19 +7018,7 @@
             </a:r>
             <a:r>
               <a:rPr lang="en-US" sz="2800" dirty="0" smtClean="0"/>
-              <a:t>       workflows</a:t>
-            </a:r>
-            <a:r>
-              <a:rPr lang="en-US" sz="2800" dirty="0" smtClean="0"/>
-              <a:t>, </a:t>
-            </a:r>
-            <a:r>
-              <a:rPr lang="en-US" sz="2800" dirty="0" smtClean="0"/>
-              <a:t>Array</a:t>
-            </a:r>
-            <a:r>
-              <a:rPr lang="en-US" sz="2800" dirty="0" smtClean="0"/>
-              <a:t>, List, </a:t>
+              <a:t>       workflows, Array, List, </a:t>
             </a:r>
             <a:r>
               <a:rPr lang="en-US" sz="2800" dirty="0" err="1" smtClean="0"/>
@@ -7004,11 +7026,7 @@
             </a:r>
             <a:r>
               <a:rPr lang="en-US" sz="2800" dirty="0" smtClean="0"/>
-              <a:t>, Option, Map, </a:t>
-            </a:r>
-            <a:r>
-              <a:rPr lang="en-US" sz="2800" dirty="0" smtClean="0"/>
-              <a:t>Set, </a:t>
+              <a:t>, Option, Map, Set, </a:t>
             </a:r>
             <a:r>
               <a:rPr lang="en-US" sz="2800" dirty="0"/>
@@ -7018,7 +7036,6 @@
               <a:rPr lang="en-US" sz="2800" dirty="0" smtClean="0"/>
               <a:t>tc.</a:t>
             </a:r>
-            <a:endParaRPr lang="en-US" sz="2800" dirty="0" smtClean="0"/>
           </a:p>
           <a:p>
             <a:r>
@@ -7529,7 +7546,7 @@
   <a:extraClrSchemeLst/>
   <a:extLst>
     <a:ext uri="{05A4C25C-085E-4340-85A3-A5531E510DB2}">
-      <thm15:themeFamily xmlns:thm15="http://schemas.microsoft.com/office/thememl/2012/main" xmlns="" name="Ion" id="{B8441ADB-2E43-4AF7-B97A-BD870242C6A8}" vid="{BACC050B-8757-4460-95D8-E37B46A6B421}"/>
+      <thm15:themeFamily xmlns:thm15="http://schemas.microsoft.com/office/thememl/2012/main" name="Ion" id="{B8441ADB-2E43-4AF7-B97A-BD870242C6A8}" vid="{BACC050B-8757-4460-95D8-E37B46A6B421}"/>
     </a:ext>
   </a:extLst>
 </a:theme>

</xml_diff>